<commit_message>
fix: review poster; adds poster image src
</commit_message>
<xml_diff>
--- a/poster/poster_english.pptx
+++ b/poster/poster_english.pptx
@@ -5017,7 +5017,7 @@
                 </a:solidFill>
                 <a:latin typeface="MetaBold-Roman" pitchFamily="34" charset="0"/>
               </a:rPr>
-              <a:t>Course of studies:</a:t>
+              <a:t>Course of Studies:</a:t>
             </a:r>
           </a:p>
           <a:p>
@@ -5033,7 +5033,7 @@
                 </a:solidFill>
                 <a:latin typeface="MetaNormal-Roman" pitchFamily="34" charset="0"/>
               </a:rPr>
-              <a:t>Information security and forensics</a:t>
+              <a:t>IT-Security and Forensics</a:t>
             </a:r>
           </a:p>
           <a:p>
@@ -5072,7 +5072,7 @@
               </a:spcBef>
             </a:pPr>
             <a:r>
-              <a:rPr lang="en-US" altLang="de-DE" sz="2400">
+              <a:rPr lang="en-US" altLang="de-DE" sz="2400" dirty="0">
                 <a:solidFill>
                   <a:schemeClr val="bg1"/>
                 </a:solidFill>
@@ -5080,12 +5080,6 @@
               </a:rPr>
               <a:t>09/30/2019</a:t>
             </a:r>
-            <a:endParaRPr lang="en-US" altLang="de-DE" sz="2400" dirty="0">
-              <a:solidFill>
-                <a:schemeClr val="bg1"/>
-              </a:solidFill>
-              <a:latin typeface="MetaNormal-Roman" pitchFamily="34" charset="0"/>
-            </a:endParaRPr>
           </a:p>
           <a:p>
             <a:pPr>
@@ -5152,7 +5146,7 @@
                 </a:solidFill>
                 <a:latin typeface="MetaBold-Roman" pitchFamily="34" charset="0"/>
               </a:rPr>
-              <a:t>First supervisor:</a:t>
+              <a:t>First Supervisor:</a:t>
             </a:r>
           </a:p>
           <a:p>
@@ -5215,7 +5209,7 @@
                 </a:solidFill>
                 <a:latin typeface="MetaBold-Roman" pitchFamily="34" charset="0"/>
               </a:rPr>
-              <a:t>Second supervisor:</a:t>
+              <a:t>Second Supervisor:</a:t>
             </a:r>
           </a:p>
           <a:p>
@@ -5348,7 +5342,7 @@
         <p:spPr>
           <a:xfrm>
             <a:off x="217488" y="18951133"/>
-            <a:ext cx="6591869" cy="646331"/>
+            <a:ext cx="6664004" cy="923330"/>
           </a:xfrm>
           <a:prstGeom prst="rect">
             <a:avLst/>
@@ -5362,7 +5356,7 @@
           <a:lstStyle/>
           <a:p>
             <a:r>
-              <a:rPr lang="de-DE" sz="1800" dirty="0">
+              <a:rPr lang="en-US" sz="1800" dirty="0">
                 <a:solidFill>
                   <a:schemeClr val="bg2"/>
                 </a:solidFill>
@@ -5371,7 +5365,7 @@
               <a:t>* Source:</a:t>
             </a:r>
             <a:br>
-              <a:rPr lang="de-DE" sz="1800" dirty="0">
+              <a:rPr lang="en-US" sz="1800" dirty="0">
                 <a:solidFill>
                   <a:schemeClr val="bg2"/>
                 </a:solidFill>
@@ -5379,13 +5373,40 @@
               </a:rPr>
             </a:br>
             <a:r>
-              <a:rPr lang="de-DE" sz="1800" dirty="0">
+              <a:rPr lang="en-US" sz="1800" dirty="0">
+                <a:solidFill>
+                  <a:schemeClr val="bg2"/>
+                </a:solidFill>
+                <a:latin typeface="Meta Normal Roman" panose="02000506050000020004" pitchFamily="2" charset="77"/>
+                <a:hlinkClick r:id="rId5"/>
+              </a:rPr>
+              <a:t>https://www.w3.org/2018/04/pressrelease-webauthn-fido2.html</a:t>
+            </a:r>
+            <a:r>
+              <a:rPr lang="en-US" sz="1800" dirty="0">
                 <a:solidFill>
                   <a:schemeClr val="bg2"/>
                 </a:solidFill>
                 <a:latin typeface="Meta Normal Roman" panose="02000506050000020004" pitchFamily="2" charset="77"/>
               </a:rPr>
-              <a:t>https://www.w3.org/2018/04/pressrelease-webauthn-fido2.html</a:t>
+              <a:t>;</a:t>
+            </a:r>
+            <a:br>
+              <a:rPr lang="en-US" sz="1800" dirty="0">
+                <a:solidFill>
+                  <a:schemeClr val="bg2"/>
+                </a:solidFill>
+                <a:latin typeface="Meta Normal Roman" panose="02000506050000020004" pitchFamily="2" charset="77"/>
+              </a:rPr>
+            </a:br>
+            <a:r>
+              <a:rPr lang="en-US" sz="1800" dirty="0">
+                <a:solidFill>
+                  <a:schemeClr val="bg2"/>
+                </a:solidFill>
+                <a:latin typeface="Meta Normal Roman" panose="02000506050000020004" pitchFamily="2" charset="77"/>
+              </a:rPr>
+              <a:t>last accessed on 11/03/2019.</a:t>
             </a:r>
           </a:p>
         </p:txBody>
@@ -5586,40 +5607,7 @@
                 </a:solidFill>
                 <a:latin typeface="MetaNormal-Roman" pitchFamily="34" charset="0"/>
               </a:rPr>
-              <a:t>Internet users are at constant risk, given that data breaches happen nearly daily.</a:t>
-            </a:r>
-          </a:p>
-          <a:p>
-            <a:pPr algn="just">
-              <a:lnSpc>
-                <a:spcPct val="80000"/>
-              </a:lnSpc>
-            </a:pPr>
-            <a:r>
-              <a:rPr lang="en-US" altLang="de-DE" sz="2400" dirty="0">
-                <a:solidFill>
-                  <a:schemeClr val="tx1"/>
-                </a:solidFill>
-                <a:latin typeface="MetaNormal-Roman" pitchFamily="34" charset="0"/>
-              </a:rPr>
-              <a:t>This master's thesis introduces and evaluates different methods of authentication and multi-factor authentication solutions, e.g., one-time passwords, with a focus on their security. Further, the Web Authentication API is explained and compared with the other multi-factor authentication solutions. The question has to be answered, whether the Web Authentication API </a:t>
-            </a:r>
-            <a:br>
-              <a:rPr lang="en-US" altLang="de-DE" sz="2400" dirty="0">
-                <a:solidFill>
-                  <a:schemeClr val="tx1"/>
-                </a:solidFill>
-                <a:latin typeface="MetaNormal-Roman" pitchFamily="34" charset="0"/>
-              </a:rPr>
-            </a:br>
-            <a:r>
-              <a:rPr lang="en-US" altLang="de-DE" sz="2400" dirty="0">
-                <a:solidFill>
-                  <a:schemeClr val="tx1"/>
-                </a:solidFill>
-                <a:latin typeface="MetaNormal-Roman" pitchFamily="34" charset="0"/>
-              </a:rPr>
-              <a:t>can replace existing multi-factor authentication solutions or to what extent it can be used in conjunction with them.</a:t>
+              <a:t>Internet users are at constant risk, given that data breaches happen nearly daily. In order to counter these threats, the user needs to deploy additional security measures. This master's thesis introduces and evaluates different methods of authentication and multi-factor authentication (MFA) solutions, e.g., one-time passwords and security tokens, with a focus on their security. Further, the Web Authentication API is explained and compared with the other MFA solutions. The question has to be answered, whether the Web Authentication API can replace existing MFA solutions or to what extent it can be used in conjunction with them.</a:t>
             </a:r>
             <a:br>
               <a:rPr lang="en-US" altLang="de-DE" sz="2400" dirty="0">
@@ -5863,7 +5851,7 @@
                 </a:solidFill>
                 <a:latin typeface="MetaNormal-Roman" pitchFamily="34" charset="0"/>
               </a:rPr>
-              <a:t>A commonly used method to achieve MFA besides the password is the usage of authentication by possession of the shred secret for time-based one-time password. However, the transport mediums, such as SMS, and service providers are a lucrative attack target.</a:t>
+              <a:t>A commonly used method to achieve MFA in combination with the password is the usage of authentication by possession of the shred secret for time-based one-time password. However, the transportation mediums, such as SMS, and service providers are a lucrative attack target.</a:t>
             </a:r>
           </a:p>
           <a:p>
@@ -5880,22 +5868,14 @@
                 <a:latin typeface="MetaNormal-Roman" pitchFamily="34" charset="0"/>
               </a:rPr>
             </a:br>
-            <a:br>
-              <a:rPr lang="en-US" altLang="de-DE" sz="2400" dirty="0">
+            <a:r>
+              <a:rPr lang="en-US" altLang="de-DE" sz="2400" b="1" dirty="0">
                 <a:solidFill>
                   <a:schemeClr val="tx1"/>
                 </a:solidFill>
                 <a:latin typeface="MetaNormal-Roman" pitchFamily="34" charset="0"/>
               </a:rPr>
-            </a:br>
-            <a:r>
-              <a:rPr lang="en-US" altLang="de-DE" sz="2400" b="1" dirty="0">
-                <a:solidFill>
-                  <a:schemeClr val="tx1"/>
-                </a:solidFill>
-                <a:latin typeface="MetaNormal-Roman" pitchFamily="34" charset="0"/>
-              </a:rPr>
-              <a:t>Time-based one-time password are not phishing resistant and especially the transport mechanisms are a subject to exploit vulnerabilities and social engineering attacks</a:t>
+              <a:t>Time-based one-time passwords are not phishing resistant and especially the transportation mechanisms are a subject social engineering attacks and exploitation.</a:t>
             </a:r>
           </a:p>
         </p:txBody>
@@ -5916,7 +5896,7 @@
         </p:nvSpPr>
         <p:spPr bwMode="auto">
           <a:xfrm>
-            <a:off x="9464676" y="7752354"/>
+            <a:off x="9524208" y="7402909"/>
             <a:ext cx="5440362" cy="4350866"/>
           </a:xfrm>
           <a:prstGeom prst="rect">
@@ -6144,7 +6124,7 @@
                 </a:solidFill>
                 <a:latin typeface="MetaNormal-Roman" pitchFamily="34" charset="0"/>
               </a:rPr>
-              <a:t>The Web Authentication API is a joint efforts of the FIDO alliance and the W3C and an evolution of the U2F protocol.</a:t>
+              <a:t>The Web Authentication API is a joint efforts of the FIDO alliance and the W3C and an evolution of the U2F protocol based on public-key cryptography.</a:t>
             </a:r>
           </a:p>
           <a:p>
@@ -6178,7 +6158,7 @@
                 </a:solidFill>
                 <a:latin typeface="MetaNormal-Roman" pitchFamily="34" charset="0"/>
               </a:rPr>
-              <a:t> provides resistance against phishing attacks and lets the user decide which authenticator should be used, e.g. a built in authenticator or an external token.</a:t>
+              <a:t> provides resistance against phishing attacks and lets the user decide which authenticator should be used, e.g., a built-in authenticator or an external token.</a:t>
             </a:r>
           </a:p>
           <a:p>
@@ -6276,7 +6256,7 @@
               <a:rPr lang="en-US" altLang="de-DE" sz="2400" dirty="0">
                 <a:latin typeface="MetaNormal-Roman" pitchFamily="34" charset="0"/>
               </a:rPr>
-              <a:t>Multi-Factor Authentication can increase the security, but is still subject to phishing attacks. It can be made phishing resistant, but it requires a change of the transportation medium or the usage of other authentication methods.</a:t>
+              <a:t>Multi-factor authentication can increase the security, but is still subject to phishing attacks. It can be made phishing resistant, but it requires a change of the transportation medium or the usage of other authentication methods.</a:t>
             </a:r>
           </a:p>
           <a:p>
@@ -6285,7 +6265,7 @@
               <a:rPr lang="en-US" altLang="de-DE" sz="2400" dirty="0">
                 <a:latin typeface="MetaNormal-Roman" pitchFamily="34" charset="0"/>
               </a:rPr>
-              <a:t>Also, the Web Authentication API has the potential to replace passwords. However, it is not yet usable enough for the end consumer, mostly because the API is not fully supported in all operating systems.</a:t>
+              <a:t>Also, the Web Authentication API has the potential to replace passwords. However, it is not yet usable enough for the end consumer, mostly because the API is not fully supported in all operating systems and web browsers.</a:t>
             </a:r>
             <a:endParaRPr lang="en-US" sz="2400" dirty="0"/>
           </a:p>
@@ -6306,14 +6286,14 @@
           <p:nvPr/>
         </p:nvPicPr>
         <p:blipFill>
-          <a:blip r:embed="rId5"/>
+          <a:blip r:embed="rId6"/>
           <a:stretch>
             <a:fillRect/>
           </a:stretch>
         </p:blipFill>
         <p:spPr>
           <a:xfrm>
-            <a:off x="4115711" y="5331748"/>
+            <a:off x="4115711" y="5271788"/>
             <a:ext cx="7878615" cy="3180447"/>
           </a:xfrm>
           <a:prstGeom prst="rect">
@@ -6336,7 +6316,7 @@
           <p:nvPr/>
         </p:nvPicPr>
         <p:blipFill>
-          <a:blip r:embed="rId6"/>
+          <a:blip r:embed="rId7"/>
           <a:srcRect/>
           <a:stretch/>
         </p:blipFill>
@@ -6475,6 +6455,46 @@
               <a:effectLst/>
               <a:latin typeface="Arial" panose="020B0604020202020204" pitchFamily="34" charset="0"/>
             </a:endParaRPr>
+          </a:p>
+        </p:txBody>
+      </p:sp>
+      <p:sp>
+        <p:nvSpPr>
+          <p:cNvPr id="24" name="TextBox 23">
+            <a:extLst>
+              <a:ext uri="{FF2B5EF4-FFF2-40B4-BE49-F238E27FC236}">
+                <a16:creationId xmlns:a16="http://schemas.microsoft.com/office/drawing/2014/main" id="{88C3A40A-818A-C84A-B857-0B663AE9F2BD}"/>
+              </a:ext>
+            </a:extLst>
+          </p:cNvPr>
+          <p:cNvSpPr txBox="1"/>
+          <p:nvPr/>
+        </p:nvSpPr>
+        <p:spPr>
+          <a:xfrm>
+            <a:off x="13094208" y="15265023"/>
+            <a:ext cx="349776" cy="523220"/>
+          </a:xfrm>
+          <a:prstGeom prst="rect">
+            <a:avLst/>
+          </a:prstGeom>
+          <a:noFill/>
+        </p:spPr>
+        <p:txBody>
+          <a:bodyPr wrap="none" rtlCol="0">
+            <a:spAutoFit/>
+          </a:bodyPr>
+          <a:lstStyle/>
+          <a:p>
+            <a:r>
+              <a:rPr lang="de-DE" sz="2800" dirty="0">
+                <a:solidFill>
+                  <a:schemeClr val="bg2"/>
+                </a:solidFill>
+                <a:latin typeface="Meta Normal Roman" panose="02000506050000020004" pitchFamily="2" charset="77"/>
+              </a:rPr>
+              <a:t>*</a:t>
+            </a:r>
           </a:p>
         </p:txBody>
       </p:sp>

</xml_diff>